<commit_message>
Uploaded Data Intake Repoert and updated presentation
</commit_message>
<xml_diff>
--- a/Cab Presentation.pptx
+++ b/Cab Presentation.pptx
@@ -114,6 +114,11 @@
       </a:defRPr>
     </a:lvl9pPr>
   </p:defaultTextStyle>
+  <p:extLst>
+    <p:ext uri="{EFAFB233-063F-42B5-8137-9DF3F51BA10A}">
+      <p15:sldGuideLst xmlns:p15="http://schemas.microsoft.com/office/powerpoint/2012/main"/>
+    </p:ext>
+  </p:extLst>
 </p:presentation>
 </file>
 
@@ -12701,7 +12706,7 @@
           <a:p>
             <a:fld id="{1160EA64-D806-43AC-9DF2-F8C432F32B4C}" type="datetimeFigureOut">
               <a:rPr lang="en-US" dirty="0"/>
-              <a:t>4/13/23</a:t>
+              <a:t>4/14/23</a:t>
             </a:fld>
             <a:endParaRPr lang="en-US" dirty="0"/>
           </a:p>
@@ -12867,7 +12872,7 @@
           <a:p>
             <a:fld id="{E9F9C37B-1D36-470B-8223-D6C91242EC14}" type="datetimeFigureOut">
               <a:rPr lang="en-US" dirty="0"/>
-              <a:t>4/13/23</a:t>
+              <a:t>4/14/23</a:t>
             </a:fld>
             <a:endParaRPr lang="en-US" dirty="0"/>
           </a:p>
@@ -13042,7 +13047,7 @@
           <a:p>
             <a:fld id="{67C6F52A-A82B-47A2-A83A-8C4C91F2D59F}" type="datetimeFigureOut">
               <a:rPr lang="en-US" dirty="0"/>
-              <a:t>4/13/23</a:t>
+              <a:t>4/14/23</a:t>
             </a:fld>
             <a:endParaRPr lang="en-US" dirty="0"/>
           </a:p>
@@ -13207,7 +13212,7 @@
           <a:p>
             <a:fld id="{F070A7B3-6521-4DCA-87E5-044747A908C1}" type="datetimeFigureOut">
               <a:rPr lang="en-US" dirty="0"/>
-              <a:t>4/13/23</a:t>
+              <a:t>4/14/23</a:t>
             </a:fld>
             <a:endParaRPr lang="en-US" dirty="0"/>
           </a:p>
@@ -13471,7 +13476,7 @@
           <a:p>
             <a:fld id="{1160EA64-D806-43AC-9DF2-F8C432F32B4C}" type="datetimeFigureOut">
               <a:rPr lang="en-US" dirty="0"/>
-              <a:t>4/13/23</a:t>
+              <a:t>4/14/23</a:t>
             </a:fld>
             <a:endParaRPr lang="en-US" dirty="0"/>
           </a:p>
@@ -13699,7 +13704,7 @@
           <a:p>
             <a:fld id="{AB134690-1557-4C89-A502-4959FE7FAD70}" type="datetimeFigureOut">
               <a:rPr lang="en-US" dirty="0"/>
-              <a:t>4/13/23</a:t>
+              <a:t>4/14/23</a:t>
             </a:fld>
             <a:endParaRPr lang="en-US" dirty="0"/>
           </a:p>
@@ -14053,7 +14058,7 @@
           <a:p>
             <a:fld id="{4F7D4976-E339-4826-83B7-FBD03F55ECF8}" type="datetimeFigureOut">
               <a:rPr lang="en-US" dirty="0"/>
-              <a:t>4/13/23</a:t>
+              <a:t>4/14/23</a:t>
             </a:fld>
             <a:endParaRPr lang="en-US" dirty="0"/>
           </a:p>
@@ -14189,7 +14194,7 @@
           <a:p>
             <a:fld id="{E1037C31-9E7A-4F99-8774-A0E530DE1A42}" type="datetimeFigureOut">
               <a:rPr lang="en-US" dirty="0"/>
-              <a:t>4/13/23</a:t>
+              <a:t>4/14/23</a:t>
             </a:fld>
             <a:endParaRPr lang="en-US" dirty="0"/>
           </a:p>
@@ -14279,7 +14284,7 @@
           <a:p>
             <a:fld id="{C278504F-A551-4DE0-9316-4DCD1D8CC752}" type="datetimeFigureOut">
               <a:rPr lang="en-US" dirty="0"/>
-              <a:t>4/13/23</a:t>
+              <a:t>4/14/23</a:t>
             </a:fld>
             <a:endParaRPr lang="en-US" dirty="0"/>
           </a:p>
@@ -14631,7 +14636,7 @@
           <a:p>
             <a:fld id="{D1BE4249-C0D0-4B06-8692-E8BB871AF643}" type="datetimeFigureOut">
               <a:rPr lang="en-US" dirty="0"/>
-              <a:t>4/13/23</a:t>
+              <a:t>4/14/23</a:t>
             </a:fld>
             <a:endParaRPr lang="en-US" dirty="0"/>
           </a:p>
@@ -14983,7 +14988,7 @@
           <a:p>
             <a:fld id="{042B0DB6-F5C7-45FB-8CF3-31B45F9C2DAC}" type="datetimeFigureOut">
               <a:rPr lang="en-US" dirty="0"/>
-              <a:t>4/13/23</a:t>
+              <a:t>4/14/23</a:t>
             </a:fld>
             <a:endParaRPr lang="en-US" dirty="0"/>
           </a:p>
@@ -15220,7 +15225,7 @@
           <a:p>
             <a:fld id="{1160EA64-D806-43AC-9DF2-F8C432F32B4C}" type="datetimeFigureOut">
               <a:rPr lang="en-US" dirty="0"/>
-              <a:t>4/13/23</a:t>
+              <a:t>4/14/23</a:t>
             </a:fld>
             <a:endParaRPr lang="en-US" dirty="0"/>
           </a:p>
@@ -16643,10 +16648,15 @@
             <p:ph idx="1"/>
           </p:nvPr>
         </p:nvSpPr>
-        <p:spPr/>
+        <p:spPr>
+          <a:xfrm>
+            <a:off x="1785366" y="2603754"/>
+            <a:ext cx="8478774" cy="3289554"/>
+          </a:xfrm>
+        </p:spPr>
         <p:txBody>
           <a:bodyPr>
-            <a:normAutofit lnSpcReduction="10000"/>
+            <a:normAutofit/>
           </a:bodyPr>
           <a:lstStyle/>
           <a:p>
@@ -16671,7 +16681,7 @@
           <a:p>
             <a:r>
               <a:rPr lang="en-US" dirty="0"/>
-              <a:t>Added 4 features – Year, Month, Date, Profit (Price Charged – Cost of Trip)</a:t>
+              <a:t>Added 5 features – Year, Month, Date, Weekday, Profit (Price Charged – Cost of Trip)</a:t>
             </a:r>
           </a:p>
           <a:p>

</xml_diff>